<commit_message>
clarified wording on one of the slides
</commit_message>
<xml_diff>
--- a/PowerPoint Slides/06 - Syntax Analysis.pptx
+++ b/PowerPoint Slides/06 - Syntax Analysis.pptx
@@ -81,7 +81,7 @@
     <p:sldId id="360" r:id="rId69"/>
   </p:sldIdLst>
   <p:sldSz cx="9144000" cy="6858000" type="screen4x3"/>
-  <p:notesSz cx="7010400" cy="9296400"/>
+  <p:notesSz cx="7315200" cy="9601200"/>
   <p:defaultTextStyle>
     <a:defPPr>
       <a:defRPr lang="en-US"/>
@@ -224,12 +224,12 @@
     </p:ext>
     <p:ext uri="{2D200454-40CA-4A62-9FC3-DE9A4176ACB9}">
       <p15:notesGuideLst xmlns:p15="http://schemas.microsoft.com/office/powerpoint/2012/main">
-        <p15:guide id="1" orient="horz" pos="2928" userDrawn="1">
+        <p15:guide id="1" orient="horz" pos="3024" userDrawn="1">
           <p15:clr>
             <a:srgbClr val="A4A3A4"/>
           </p15:clr>
         </p15:guide>
-        <p15:guide id="2" pos="2208" userDrawn="1">
+        <p15:guide id="2" pos="2304" userDrawn="1">
           <p15:clr>
             <a:srgbClr val="A4A3A4"/>
           </p15:clr>
@@ -277,8 +277,8 @@
         </p:nvSpPr>
         <p:spPr bwMode="auto">
           <a:xfrm>
-            <a:off x="3971926" y="0"/>
-            <a:ext cx="3038475" cy="465138"/>
+            <a:off x="4144619" y="0"/>
+            <a:ext cx="3170583" cy="480388"/>
           </a:xfrm>
           <a:prstGeom prst="rect">
             <a:avLst/>
@@ -293,13 +293,13 @@
           <a:effectLst/>
         </p:spPr>
         <p:txBody>
-          <a:bodyPr vert="horz" wrap="square" lIns="93177" tIns="46589" rIns="93177" bIns="46589" numCol="1" anchor="t" anchorCtr="0" compatLnSpc="1">
+          <a:bodyPr vert="horz" wrap="square" lIns="96653" tIns="48327" rIns="96653" bIns="48327" numCol="1" anchor="t" anchorCtr="0" compatLnSpc="1">
             <a:prstTxWarp prst="textNoShape">
               <a:avLst/>
             </a:prstTxWarp>
           </a:bodyPr>
           <a:lstStyle>
-            <a:lvl1pPr algn="r" defTabSz="931863">
+            <a:lvl1pPr algn="r" defTabSz="966621">
               <a:defRPr sz="1200" smtClean="0"/>
             </a:lvl1pPr>
           </a:lstStyle>
@@ -328,8 +328,8 @@
         </p:nvSpPr>
         <p:spPr bwMode="auto">
           <a:xfrm>
-            <a:off x="3971926" y="8831264"/>
-            <a:ext cx="3038475" cy="465137"/>
+            <a:off x="4144619" y="9120814"/>
+            <a:ext cx="3170583" cy="480387"/>
           </a:xfrm>
           <a:prstGeom prst="rect">
             <a:avLst/>
@@ -344,13 +344,13 @@
           <a:effectLst/>
         </p:spPr>
         <p:txBody>
-          <a:bodyPr vert="horz" wrap="square" lIns="93177" tIns="46589" rIns="93177" bIns="46589" numCol="1" anchor="b" anchorCtr="0" compatLnSpc="1">
+          <a:bodyPr vert="horz" wrap="square" lIns="96653" tIns="48327" rIns="96653" bIns="48327" numCol="1" anchor="b" anchorCtr="0" compatLnSpc="1">
             <a:prstTxWarp prst="textNoShape">
               <a:avLst/>
             </a:prstTxWarp>
           </a:bodyPr>
           <a:lstStyle>
-            <a:lvl1pPr algn="r" defTabSz="931863">
+            <a:lvl1pPr algn="r" defTabSz="966621">
               <a:defRPr sz="1200" smtClean="0"/>
             </a:lvl1pPr>
           </a:lstStyle>
@@ -428,7 +428,7 @@
         <p:spPr bwMode="auto">
           <a:xfrm>
             <a:off x="1" y="0"/>
-            <a:ext cx="3038475" cy="465138"/>
+            <a:ext cx="3170583" cy="480388"/>
           </a:xfrm>
           <a:prstGeom prst="rect">
             <a:avLst/>
@@ -443,13 +443,13 @@
           <a:effectLst/>
         </p:spPr>
         <p:txBody>
-          <a:bodyPr vert="horz" wrap="square" lIns="93177" tIns="46589" rIns="93177" bIns="46589" numCol="1" anchor="t" anchorCtr="0" compatLnSpc="1">
+          <a:bodyPr vert="horz" wrap="square" lIns="96653" tIns="48327" rIns="96653" bIns="48327" numCol="1" anchor="t" anchorCtr="0" compatLnSpc="1">
             <a:prstTxWarp prst="textNoShape">
               <a:avLst/>
             </a:prstTxWarp>
           </a:bodyPr>
           <a:lstStyle>
-            <a:lvl1pPr algn="l" defTabSz="931863">
+            <a:lvl1pPr algn="l" defTabSz="966621">
               <a:defRPr sz="1200" smtClean="0"/>
             </a:lvl1pPr>
           </a:lstStyle>
@@ -476,8 +476,8 @@
         </p:nvSpPr>
         <p:spPr bwMode="auto">
           <a:xfrm>
-            <a:off x="3971926" y="0"/>
-            <a:ext cx="3038475" cy="465138"/>
+            <a:off x="4144619" y="0"/>
+            <a:ext cx="3170583" cy="480388"/>
           </a:xfrm>
           <a:prstGeom prst="rect">
             <a:avLst/>
@@ -492,13 +492,13 @@
           <a:effectLst/>
         </p:spPr>
         <p:txBody>
-          <a:bodyPr vert="horz" wrap="square" lIns="93177" tIns="46589" rIns="93177" bIns="46589" numCol="1" anchor="t" anchorCtr="0" compatLnSpc="1">
+          <a:bodyPr vert="horz" wrap="square" lIns="96653" tIns="48327" rIns="96653" bIns="48327" numCol="1" anchor="t" anchorCtr="0" compatLnSpc="1">
             <a:prstTxWarp prst="textNoShape">
               <a:avLst/>
             </a:prstTxWarp>
           </a:bodyPr>
           <a:lstStyle>
-            <a:lvl1pPr algn="r" defTabSz="931863">
+            <a:lvl1pPr algn="r" defTabSz="966621">
               <a:defRPr sz="1200" smtClean="0"/>
             </a:lvl1pPr>
           </a:lstStyle>
@@ -522,8 +522,8 @@
         </p:nvSpPr>
         <p:spPr bwMode="auto">
           <a:xfrm>
-            <a:off x="1181100" y="696913"/>
-            <a:ext cx="4648200" cy="3486150"/>
+            <a:off x="1257300" y="719138"/>
+            <a:ext cx="4800600" cy="3600450"/>
           </a:xfrm>
           <a:prstGeom prst="rect">
             <a:avLst/>
@@ -551,8 +551,8 @@
         </p:nvSpPr>
         <p:spPr bwMode="auto">
           <a:xfrm>
-            <a:off x="935039" y="4416426"/>
-            <a:ext cx="5140325" cy="4183063"/>
+            <a:off x="975694" y="4561227"/>
+            <a:ext cx="5363817" cy="4320213"/>
           </a:xfrm>
           <a:prstGeom prst="rect">
             <a:avLst/>
@@ -567,7 +567,7 @@
           <a:effectLst/>
         </p:spPr>
         <p:txBody>
-          <a:bodyPr vert="horz" wrap="square" lIns="93177" tIns="46589" rIns="93177" bIns="46589" numCol="1" anchor="t" anchorCtr="0" compatLnSpc="1">
+          <a:bodyPr vert="horz" wrap="square" lIns="96653" tIns="48327" rIns="96653" bIns="48327" numCol="1" anchor="t" anchorCtr="0" compatLnSpc="1">
             <a:prstTxWarp prst="textNoShape">
               <a:avLst/>
             </a:prstTxWarp>
@@ -622,8 +622,8 @@
         </p:nvSpPr>
         <p:spPr bwMode="auto">
           <a:xfrm>
-            <a:off x="1" y="8831264"/>
-            <a:ext cx="3038475" cy="465137"/>
+            <a:off x="1" y="9120814"/>
+            <a:ext cx="3170583" cy="480387"/>
           </a:xfrm>
           <a:prstGeom prst="rect">
             <a:avLst/>
@@ -638,13 +638,13 @@
           <a:effectLst/>
         </p:spPr>
         <p:txBody>
-          <a:bodyPr vert="horz" wrap="square" lIns="93177" tIns="46589" rIns="93177" bIns="46589" numCol="1" anchor="b" anchorCtr="0" compatLnSpc="1">
+          <a:bodyPr vert="horz" wrap="square" lIns="96653" tIns="48327" rIns="96653" bIns="48327" numCol="1" anchor="b" anchorCtr="0" compatLnSpc="1">
             <a:prstTxWarp prst="textNoShape">
               <a:avLst/>
             </a:prstTxWarp>
           </a:bodyPr>
           <a:lstStyle>
-            <a:lvl1pPr algn="l" defTabSz="931863">
+            <a:lvl1pPr algn="l" defTabSz="966621">
               <a:defRPr sz="1200" smtClean="0"/>
             </a:lvl1pPr>
           </a:lstStyle>
@@ -668,8 +668,8 @@
         </p:nvSpPr>
         <p:spPr bwMode="auto">
           <a:xfrm>
-            <a:off x="3971926" y="8831264"/>
-            <a:ext cx="3038475" cy="465137"/>
+            <a:off x="4144619" y="9120814"/>
+            <a:ext cx="3170583" cy="480387"/>
           </a:xfrm>
           <a:prstGeom prst="rect">
             <a:avLst/>
@@ -684,13 +684,13 @@
           <a:effectLst/>
         </p:spPr>
         <p:txBody>
-          <a:bodyPr vert="horz" wrap="square" lIns="93177" tIns="46589" rIns="93177" bIns="46589" numCol="1" anchor="b" anchorCtr="0" compatLnSpc="1">
+          <a:bodyPr vert="horz" wrap="square" lIns="96653" tIns="48327" rIns="96653" bIns="48327" numCol="1" anchor="b" anchorCtr="0" compatLnSpc="1">
             <a:prstTxWarp prst="textNoShape">
               <a:avLst/>
             </a:prstTxWarp>
           </a:bodyPr>
           <a:lstStyle>
-            <a:lvl1pPr algn="r" defTabSz="931863">
+            <a:lvl1pPr algn="r" defTabSz="966621">
               <a:defRPr sz="1200" smtClean="0"/>
             </a:lvl1pPr>
           </a:lstStyle>
@@ -5359,7 +5359,7 @@
           <a:bodyPr/>
           <a:lstStyle/>
           <a:p>
-            <a:pPr defTabSz="930275"/>
+            <a:pPr defTabSz="964974"/>
             <a:r>
               <a:rPr lang="en-US"/>
               <a:t>Subprograms</a:t>
@@ -5384,10 +5384,10 @@
           <a:bodyPr/>
           <a:lstStyle/>
           <a:p>
-            <a:pPr defTabSz="930275"/>
+            <a:pPr defTabSz="964974"/>
             <a:fld id="{F7624EB1-F083-4E77-9F78-569C6646FEF6}" type="slidenum">
               <a:rPr lang="en-US" smtClean="0"/>
-              <a:pPr defTabSz="930275"/>
+              <a:pPr defTabSz="964974"/>
               <a:t>47</a:t>
             </a:fld>
             <a:endParaRPr lang="en-US"/>
@@ -5594,7 +5594,7 @@
           <a:bodyPr/>
           <a:lstStyle/>
           <a:p>
-            <a:pPr defTabSz="930275"/>
+            <a:pPr defTabSz="964974"/>
             <a:r>
               <a:rPr lang="en-US"/>
               <a:t>Subprograms</a:t>
@@ -5619,10 +5619,10 @@
           <a:bodyPr/>
           <a:lstStyle/>
           <a:p>
-            <a:pPr defTabSz="930275"/>
+            <a:pPr defTabSz="964974"/>
             <a:fld id="{D92411FA-7305-4EA7-A40B-F5D90476B901}" type="slidenum">
               <a:rPr lang="en-US" smtClean="0"/>
-              <a:pPr defTabSz="930275"/>
+              <a:pPr defTabSz="964974"/>
               <a:t>49</a:t>
             </a:fld>
             <a:endParaRPr lang="en-US"/>
@@ -5712,7 +5712,7 @@
           <a:bodyPr/>
           <a:lstStyle/>
           <a:p>
-            <a:pPr defTabSz="930275"/>
+            <a:pPr defTabSz="964974"/>
             <a:r>
               <a:rPr lang="en-US"/>
               <a:t>Subprograms</a:t>
@@ -5737,10 +5737,10 @@
           <a:bodyPr/>
           <a:lstStyle/>
           <a:p>
-            <a:pPr defTabSz="930275"/>
+            <a:pPr defTabSz="964974"/>
             <a:fld id="{E4963487-933C-4DBA-A7C2-D88BC4B3A77E}" type="slidenum">
               <a:rPr lang="en-US" smtClean="0"/>
-              <a:pPr defTabSz="930275"/>
+              <a:pPr defTabSz="964974"/>
               <a:t>50</a:t>
             </a:fld>
             <a:endParaRPr lang="en-US"/>
@@ -26582,7 +26582,15 @@
           <a:p>
             <a:r>
               <a:rPr lang="en-US" dirty="0"/>
-              <a:t>In order to ease the transition to error recovery in the next version of the parser, most parsing methods will wrap the basic parsing methods in a </a:t>
+              <a:t>In order to ease the transition to error recovery in the next version of the parser, most parsing methods will wrap the basic </a:t>
+            </a:r>
+            <a:r>
+              <a:rPr lang="en-US"/>
+              <a:t>parsing logic </a:t>
+            </a:r>
+            <a:r>
+              <a:rPr lang="en-US" dirty="0"/>
+              <a:t>in a </a:t>
             </a:r>
             <a:r>
               <a:rPr lang="en-US" dirty="0">

</xml_diff>

<commit_message>
minor changes to two slides
</commit_message>
<xml_diff>
--- a/PowerPoint Slides/06 - Syntax Analysis.pptx
+++ b/PowerPoint Slides/06 - Syntax Analysis.pptx
@@ -17474,7 +17474,7 @@
             <a:pPr algn="l"/>
             <a:r>
               <a:rPr lang="en-US" sz="2000" dirty="0"/>
-              <a:t>first set for</a:t>
+              <a:t>first check for</a:t>
             </a:r>
           </a:p>
           <a:p>
@@ -26582,15 +26582,7 @@
           <a:p>
             <a:r>
               <a:rPr lang="en-US" dirty="0"/>
-              <a:t>In order to ease the transition to error recovery in the next version of the parser, most parsing methods will wrap the basic </a:t>
-            </a:r>
-            <a:r>
-              <a:rPr lang="en-US"/>
-              <a:t>parsing logic </a:t>
-            </a:r>
-            <a:r>
-              <a:rPr lang="en-US" dirty="0"/>
-              <a:t>in a </a:t>
+              <a:t>In order to ease the transition to error recovery in the next version of the parser, most parsing methods will wrap the basic parsing logic in a </a:t>
             </a:r>
             <a:r>
               <a:rPr lang="en-US" dirty="0">
@@ -27445,24 +27437,36 @@
           <a:lstStyle/>
           <a:p>
             <a:r>
-              <a:rPr lang="en-US" dirty="0"/>
+              <a:rPr lang="en-US"/>
               <a:t>To implement methods </a:t>
+            </a:r>
+            <a:r>
+              <a:rPr lang="en-US" dirty="0" err="1">
+                <a:latin typeface="Consolas" panose="020B0609020204030204" pitchFamily="49" charset="0"/>
+              </a:rPr>
+              <a:t>parseVariable</a:t>
             </a:r>
             <a:r>
               <a:rPr lang="en-US" dirty="0">
                 <a:latin typeface="Consolas" panose="020B0609020204030204" pitchFamily="49" charset="0"/>
               </a:rPr>
-              <a:t>parseVariable()</a:t>
+              <a:t>()</a:t>
             </a:r>
             <a:r>
               <a:rPr lang="en-US" dirty="0"/>
               <a:t> and </a:t>
+            </a:r>
+            <a:r>
+              <a:rPr lang="en-US" dirty="0" err="1">
+                <a:latin typeface="Consolas" panose="020B0609020204030204" pitchFamily="49" charset="0"/>
+              </a:rPr>
+              <a:t>parseNamedValue</a:t>
             </a:r>
             <a:r>
               <a:rPr lang="en-US" dirty="0">
                 <a:latin typeface="Consolas" panose="020B0609020204030204" pitchFamily="49" charset="0"/>
               </a:rPr>
-              <a:t>parseNamedValue()</a:t>
+              <a:t>()</a:t>
             </a:r>
             <a:r>
               <a:rPr lang="en-US" dirty="0"/>

</xml_diff>

<commit_message>
minor corrections to one slide
</commit_message>
<xml_diff>
--- a/PowerPoint Slides/06 - Syntax Analysis.pptx
+++ b/PowerPoint Slides/06 - Syntax Analysis.pptx
@@ -75,7 +75,7 @@
     <p:sldId id="328" r:id="rId63"/>
     <p:sldId id="336" r:id="rId64"/>
     <p:sldId id="348" r:id="rId65"/>
-    <p:sldId id="349" r:id="rId66"/>
+    <p:sldId id="371" r:id="rId66"/>
     <p:sldId id="350" r:id="rId67"/>
     <p:sldId id="351" r:id="rId68"/>
     <p:sldId id="357" r:id="rId69"/>
@@ -28135,17 +28135,14 @@
           <a:p>
             <a:r>
               <a:rPr lang="en-US" dirty="0"/>
-              <a:t>Key Methods Class </a:t>
-            </a:r>
-            <a:r>
-              <a:rPr lang="en-US" dirty="0" err="1">
+              <a:t>Two Key Methods in Class </a:t>
+            </a:r>
+            <a:r>
+              <a:rPr lang="en-US" dirty="0">
                 <a:latin typeface="Consolas" panose="020B0609020204030204" pitchFamily="49" charset="0"/>
               </a:rPr>
               <a:t>ErrorHandler</a:t>
             </a:r>
-            <a:endParaRPr lang="en-US" dirty="0">
-              <a:latin typeface="Consolas" panose="020B0609020204030204" pitchFamily="49" charset="0"/>
-            </a:endParaRPr>
           </a:p>
         </p:txBody>
       </p:sp>
@@ -28188,7 +28185,7 @@
               <a:rPr lang="en-US" sz="1800" dirty="0">
                 <a:latin typeface="Consolas" panose="020B0609020204030204" pitchFamily="49" charset="0"/>
               </a:rPr>
-              <a:t> * Reports the error.  Stops compilation if the maximum</a:t>
+              <a:t> * Returns true if errors have been reported by the</a:t>
             </a:r>
           </a:p>
           <a:p>
@@ -28202,7 +28199,7 @@
               <a:rPr lang="en-US" sz="1800" dirty="0">
                 <a:latin typeface="Consolas" panose="020B0609020204030204" pitchFamily="49" charset="0"/>
               </a:rPr>
-              <a:t> * number of errors have been reported.</a:t>
+              <a:t> * error handler.</a:t>
             </a:r>
           </a:p>
           <a:p>
@@ -28230,31 +28227,31 @@
               <a:rPr lang="en-US" sz="1800" dirty="0">
                 <a:latin typeface="Consolas" panose="020B0609020204030204" pitchFamily="49" charset="0"/>
               </a:rPr>
-              <a:t>public void </a:t>
+              <a:t>public </a:t>
             </a:r>
             <a:r>
               <a:rPr lang="en-US" sz="1800" dirty="0" err="1">
                 <a:latin typeface="Consolas" panose="020B0609020204030204" pitchFamily="49" charset="0"/>
               </a:rPr>
-              <a:t>reportError</a:t>
+              <a:t>boolean</a:t>
             </a:r>
             <a:r>
               <a:rPr lang="en-US" sz="1800" dirty="0">
                 <a:latin typeface="Consolas" panose="020B0609020204030204" pitchFamily="49" charset="0"/>
               </a:rPr>
-              <a:t>(</a:t>
+              <a:t> </a:t>
             </a:r>
             <a:r>
               <a:rPr lang="en-US" sz="1800" dirty="0" err="1">
                 <a:latin typeface="Consolas" panose="020B0609020204030204" pitchFamily="49" charset="0"/>
               </a:rPr>
-              <a:t>CompilerException</a:t>
+              <a:t>errorsExist</a:t>
             </a:r>
             <a:r>
               <a:rPr lang="en-US" sz="1800" dirty="0">
                 <a:latin typeface="Consolas" panose="020B0609020204030204" pitchFamily="49" charset="0"/>
               </a:rPr>
-              <a:t> e)</a:t>
+              <a:t>()</a:t>
             </a:r>
           </a:p>
           <a:p>
@@ -28293,7 +28290,7 @@
               <a:rPr lang="en-US" sz="1800" dirty="0">
                 <a:latin typeface="Consolas" panose="020B0609020204030204" pitchFamily="49" charset="0"/>
               </a:rPr>
-              <a:t> * Reports the error and exits compilation.</a:t>
+              <a:t> * Reports the error.  Stops compilation if the maximum</a:t>
             </a:r>
           </a:p>
           <a:p>
@@ -28307,7 +28304,7 @@
               <a:rPr lang="en-US" sz="1800" dirty="0">
                 <a:latin typeface="Consolas" panose="020B0609020204030204" pitchFamily="49" charset="0"/>
               </a:rPr>
-              <a:t> */</a:t>
+              <a:t> * number of errors have been reported.</a:t>
             </a:r>
           </a:p>
           <a:p>
@@ -28321,19 +28318,7 @@
               <a:rPr lang="en-US" sz="1800" dirty="0">
                 <a:latin typeface="Consolas" panose="020B0609020204030204" pitchFamily="49" charset="0"/>
               </a:rPr>
-              <a:t>public void </a:t>
-            </a:r>
-            <a:r>
-              <a:rPr lang="en-US" sz="1800" dirty="0" err="1">
-                <a:latin typeface="Consolas" panose="020B0609020204030204" pitchFamily="49" charset="0"/>
-              </a:rPr>
-              <a:t>reportFatalError</a:t>
-            </a:r>
-            <a:r>
-              <a:rPr lang="en-US" sz="1800" dirty="0">
-                <a:latin typeface="Consolas" panose="020B0609020204030204" pitchFamily="49" charset="0"/>
-              </a:rPr>
-              <a:t>(Exception e)</a:t>
+              <a:t> */</a:t>
             </a:r>
           </a:p>
           <a:p>
@@ -28343,59 +28328,6 @@
               </a:spcBef>
               <a:buNone/>
             </a:pPr>
-            <a:endParaRPr lang="en-US" sz="1800" dirty="0">
-              <a:latin typeface="Consolas" panose="020B0609020204030204" pitchFamily="49" charset="0"/>
-            </a:endParaRPr>
-          </a:p>
-          <a:p>
-            <a:pPr marL="182880" lvl="1" indent="0">
-              <a:spcBef>
-                <a:spcPts val="200"/>
-              </a:spcBef>
-              <a:buNone/>
-            </a:pPr>
-            <a:r>
-              <a:rPr lang="en-US" sz="1800" dirty="0">
-                <a:latin typeface="Consolas" panose="020B0609020204030204" pitchFamily="49" charset="0"/>
-              </a:rPr>
-              <a:t>/**</a:t>
-            </a:r>
-          </a:p>
-          <a:p>
-            <a:pPr marL="182880" lvl="1" indent="0">
-              <a:spcBef>
-                <a:spcPts val="200"/>
-              </a:spcBef>
-              <a:buNone/>
-            </a:pPr>
-            <a:r>
-              <a:rPr lang="en-US" sz="1800" dirty="0">
-                <a:latin typeface="Consolas" panose="020B0609020204030204" pitchFamily="49" charset="0"/>
-              </a:rPr>
-              <a:t> * Reports a warning and continues compilation.</a:t>
-            </a:r>
-          </a:p>
-          <a:p>
-            <a:pPr marL="182880" lvl="1" indent="0">
-              <a:spcBef>
-                <a:spcPts val="200"/>
-              </a:spcBef>
-              <a:buNone/>
-            </a:pPr>
-            <a:r>
-              <a:rPr lang="en-US" sz="1800" dirty="0">
-                <a:latin typeface="Consolas" panose="020B0609020204030204" pitchFamily="49" charset="0"/>
-              </a:rPr>
-              <a:t> */</a:t>
-            </a:r>
-          </a:p>
-          <a:p>
-            <a:pPr marL="182880" lvl="1" indent="0">
-              <a:spcBef>
-                <a:spcPts val="200"/>
-              </a:spcBef>
-              <a:buNone/>
-            </a:pPr>
             <a:r>
               <a:rPr lang="en-US" sz="1800" dirty="0">
                 <a:latin typeface="Consolas" panose="020B0609020204030204" pitchFamily="49" charset="0"/>
@@ -28406,25 +28338,13 @@
               <a:rPr lang="en-US" sz="1800" dirty="0" err="1">
                 <a:latin typeface="Consolas" panose="020B0609020204030204" pitchFamily="49" charset="0"/>
               </a:rPr>
-              <a:t>reportWarning</a:t>
+              <a:t>reportError</a:t>
             </a:r>
             <a:r>
               <a:rPr lang="en-US" sz="1800" dirty="0">
                 <a:latin typeface="Consolas" panose="020B0609020204030204" pitchFamily="49" charset="0"/>
               </a:rPr>
-              <a:t>(String </a:t>
-            </a:r>
-            <a:r>
-              <a:rPr lang="en-US" sz="1800" dirty="0" err="1">
-                <a:latin typeface="Consolas" panose="020B0609020204030204" pitchFamily="49" charset="0"/>
-              </a:rPr>
-              <a:t>warningMessage</a:t>
-            </a:r>
-            <a:r>
-              <a:rPr lang="en-US" sz="1800" dirty="0">
-                <a:latin typeface="Consolas" panose="020B0609020204030204" pitchFamily="49" charset="0"/>
-              </a:rPr>
-              <a:t>)</a:t>
+              <a:t>(CompilerException e)</a:t>
             </a:r>
           </a:p>
         </p:txBody>
@@ -28490,7 +28410,7 @@
     </p:spTree>
     <p:extLst>
       <p:ext uri="{BB962C8B-B14F-4D97-AF65-F5344CB8AC3E}">
-        <p14:creationId xmlns:p14="http://schemas.microsoft.com/office/powerpoint/2010/main" val="2935893125"/>
+        <p14:creationId xmlns:p14="http://schemas.microsoft.com/office/powerpoint/2010/main" val="766059711"/>
       </p:ext>
     </p:extLst>
   </p:cSld>

</xml_diff>

<commit_message>
minor updates to one slide
</commit_message>
<xml_diff>
--- a/PowerPoint Slides/06 - Syntax Analysis.pptx
+++ b/PowerPoint Slides/06 - Syntax Analysis.pptx
@@ -18,7 +18,7 @@
     <p:sldId id="289" r:id="rId6"/>
     <p:sldId id="310" r:id="rId7"/>
     <p:sldId id="290" r:id="rId8"/>
-    <p:sldId id="315" r:id="rId9"/>
+    <p:sldId id="372" r:id="rId9"/>
     <p:sldId id="311" r:id="rId10"/>
     <p:sldId id="292" r:id="rId11"/>
     <p:sldId id="312" r:id="rId12"/>
@@ -31246,7 +31246,7 @@
             </a:r>
             <a:r>
               <a:rPr lang="en-US" dirty="0"/>
-              <a:t>, the symbol returned from the scanner should contain a symbol that could start on the right side of the rule </a:t>
+              <a:t>, the symbol returned from the scanner should be a symbol that could start on the right side of the rule </a:t>
             </a:r>
             <a:r>
               <a:rPr lang="en-US" dirty="0">
@@ -31275,33 +31275,43 @@
               <a:t>On exit from the method </a:t>
             </a:r>
             <a:r>
-              <a:rPr lang="en-US" dirty="0" err="1">
-                <a:latin typeface="Consolas" pitchFamily="49" charset="0"/>
-                <a:cs typeface="Consolas" pitchFamily="49" charset="0"/>
-              </a:rPr>
-              <a:t>parseN</a:t>
-            </a:r>
-            <a:r>
               <a:rPr lang="en-US" dirty="0">
                 <a:latin typeface="Consolas" pitchFamily="49" charset="0"/>
                 <a:cs typeface="Consolas" pitchFamily="49" charset="0"/>
               </a:rPr>
-              <a:t>()</a:t>
-            </a:r>
-            <a:r>
-              <a:rPr lang="en-US" dirty="0"/>
-              <a:t>, the symbol returned from the scanner should contain the first symbol that could follow a syntactic phrase corresponding to </a:t>
+              <a:t>parseN()</a:t>
+            </a:r>
+            <a:r>
+              <a:rPr lang="en-US" dirty="0"/>
+              <a:t>, the symbol returned from the scanner should be a symbol that could follow </a:t>
             </a:r>
             <a:r>
               <a:rPr lang="en-US" dirty="0">
+                <a:latin typeface="Consolas" panose="020B0609020204030204" pitchFamily="49" charset="0"/>
                 <a:cs typeface="Consolas" pitchFamily="49" charset="0"/>
               </a:rPr>
               <a:t>N</a:t>
             </a:r>
             <a:r>
-              <a:rPr lang="en-US" dirty="0"/>
+              <a:rPr lang="en-US" dirty="0">
+                <a:cs typeface="Consolas" pitchFamily="49" charset="0"/>
+              </a:rPr>
+              <a:t>; i.e., a symbol in </a:t>
+            </a:r>
+            <a:r>
+              <a:rPr lang="en-US" dirty="0">
+                <a:latin typeface="Consolas" panose="020B0609020204030204" pitchFamily="49" charset="0"/>
+                <a:cs typeface="Consolas" pitchFamily="49" charset="0"/>
+              </a:rPr>
+              <a:t>Follow(N)</a:t>
+            </a:r>
+            <a:r>
+              <a:rPr lang="en-US" dirty="0">
+                <a:cs typeface="Consolas" pitchFamily="49" charset="0"/>
+              </a:rPr>
               <a:t>.</a:t>
             </a:r>
+            <a:endParaRPr lang="en-US" dirty="0"/>
           </a:p>
           <a:p>
             <a:r>

</xml_diff>